<commit_message>
APP-entrega e alteração no pptx de apresentação
</commit_message>
<xml_diff>
--- a/doc/AMSI - Apresentação de Projeto Final.pptx
+++ b/doc/AMSI - Apresentação de Projeto Final.pptx
@@ -2566,7 +2566,7 @@
 <dgm:dataModel xmlns:dgm="http://schemas.openxmlformats.org/drawingml/2006/diagram" xmlns:a="http://schemas.openxmlformats.org/drawingml/2006/main">
   <dgm:ptLst>
     <dgm:pt modelId="{CAA69D9E-967C-4D52-A963-5CF0B6CD8823}" type="doc">
-      <dgm:prSet loTypeId="urn:microsoft.com/office/officeart/2005/8/layout/vList2" loCatId="list" qsTypeId="urn:microsoft.com/office/officeart/2005/8/quickstyle/simple5" qsCatId="simple" csTypeId="urn:microsoft.com/office/officeart/2005/8/colors/accent0_2" csCatId="mainScheme"/>
+      <dgm:prSet loTypeId="urn:microsoft.com/office/officeart/2005/8/layout/vList2" loCatId="list" qsTypeId="urn:microsoft.com/office/officeart/2005/8/quickstyle/simple5" qsCatId="simple" csTypeId="urn:microsoft.com/office/officeart/2005/8/colors/accent0_2" csCatId="mainScheme" phldr="1"/>
       <dgm:spPr/>
       <dgm:t>
         <a:bodyPr/>
@@ -3057,7 +3057,7 @@
             <a:buNone/>
           </a:pPr>
           <a:r>
-            <a:rPr lang="pt-PT" sz="2900" kern="1200">
+            <a:rPr lang="pt-PT" sz="2900" kern="1200" dirty="0">
               <a:solidFill>
                 <a:srgbClr val="67AEAA"/>
               </a:solidFill>
@@ -3065,9 +3065,9 @@
               <a:ea typeface="+mn-ea"/>
               <a:cs typeface="+mn-cs"/>
             </a:rPr>
-            <a:t>Mockups da Aplicação</a:t>
+            <a:t>Opções e Ideias</a:t>
           </a:r>
-          <a:endParaRPr lang="en-US" sz="2900" kern="1200">
+          <a:endParaRPr lang="en-US" sz="2900" kern="1200" dirty="0">
             <a:solidFill>
               <a:srgbClr val="67AEAA"/>
             </a:solidFill>
@@ -3120,7 +3120,7 @@
             <a:buNone/>
           </a:pPr>
           <a:r>
-            <a:rPr lang="pt-PT" sz="2900" kern="1200" dirty="0">
+            <a:rPr lang="pt-PT" sz="2900" kern="1200" noProof="0" dirty="0">
               <a:solidFill>
                 <a:srgbClr val="67AEAA"/>
               </a:solidFill>
@@ -3128,16 +3128,19 @@
               <a:ea typeface="+mn-ea"/>
               <a:cs typeface="+mn-cs"/>
             </a:rPr>
-            <a:t>Opções e Ideias</a:t>
+            <a:t>Tecnologias</a:t>
           </a:r>
-          <a:endParaRPr lang="en-US" sz="2900" kern="1200" dirty="0">
-            <a:solidFill>
-              <a:srgbClr val="67AEAA"/>
-            </a:solidFill>
-            <a:latin typeface="Franklin Gothic Book" panose="020F0502020204030204"/>
-            <a:ea typeface="+mn-ea"/>
-            <a:cs typeface="+mn-cs"/>
-          </a:endParaRPr>
+          <a:r>
+            <a:rPr lang="en-US" sz="2900" kern="1200" dirty="0">
+              <a:solidFill>
+                <a:srgbClr val="67AEAA"/>
+              </a:solidFill>
+              <a:latin typeface="Franklin Gothic Book" panose="020F0502020204030204"/>
+              <a:ea typeface="+mn-ea"/>
+              <a:cs typeface="+mn-cs"/>
+            </a:rPr>
+            <a:t> </a:t>
+          </a:r>
         </a:p>
       </dgm:t>
     </dgm:pt>
@@ -5118,7 +5121,7 @@
             <a:buNone/>
           </a:pPr>
           <a:r>
-            <a:rPr lang="pt-PT" sz="2900" kern="1200">
+            <a:rPr lang="pt-PT" sz="2900" kern="1200" dirty="0">
               <a:solidFill>
                 <a:srgbClr val="67AEAA"/>
               </a:solidFill>
@@ -5126,9 +5129,9 @@
               <a:ea typeface="+mn-ea"/>
               <a:cs typeface="+mn-cs"/>
             </a:rPr>
-            <a:t>Mockups da Aplicação</a:t>
+            <a:t>Opções e Ideias</a:t>
           </a:r>
-          <a:endParaRPr lang="en-US" sz="2900" kern="1200">
+          <a:endParaRPr lang="en-US" sz="2900" kern="1200" dirty="0">
             <a:solidFill>
               <a:srgbClr val="67AEAA"/>
             </a:solidFill>
@@ -5260,7 +5263,7 @@
             <a:buNone/>
           </a:pPr>
           <a:r>
-            <a:rPr lang="pt-PT" sz="2900" kern="1200" dirty="0">
+            <a:rPr lang="pt-PT" sz="2900" kern="1200" noProof="0" dirty="0">
               <a:solidFill>
                 <a:srgbClr val="67AEAA"/>
               </a:solidFill>
@@ -5268,16 +5271,19 @@
               <a:ea typeface="+mn-ea"/>
               <a:cs typeface="+mn-cs"/>
             </a:rPr>
-            <a:t>Opções e Ideias</a:t>
+            <a:t>Tecnologias</a:t>
           </a:r>
-          <a:endParaRPr lang="en-US" sz="2900" kern="1200" dirty="0">
-            <a:solidFill>
-              <a:srgbClr val="67AEAA"/>
-            </a:solidFill>
-            <a:latin typeface="Franklin Gothic Book" panose="020F0502020204030204"/>
-            <a:ea typeface="+mn-ea"/>
-            <a:cs typeface="+mn-cs"/>
-          </a:endParaRPr>
+          <a:r>
+            <a:rPr lang="en-US" sz="2900" kern="1200" dirty="0">
+              <a:solidFill>
+                <a:srgbClr val="67AEAA"/>
+              </a:solidFill>
+              <a:latin typeface="Franklin Gothic Book" panose="020F0502020204030204"/>
+              <a:ea typeface="+mn-ea"/>
+              <a:cs typeface="+mn-cs"/>
+            </a:rPr>
+            <a:t> </a:t>
+          </a:r>
         </a:p>
       </dsp:txBody>
       <dsp:txXfrm>
@@ -11103,7 +11109,7 @@
             <a:pPr rtl="0"/>
             <a:fld id="{EB928736-AA0B-442D-A1AF-8261F7034BF9}" type="datetime1">
               <a:rPr lang="pt-PT" smtClean="0"/>
-              <a:t>23/01/2022</a:t>
+              <a:t>24/01/2022</a:t>
             </a:fld>
             <a:endParaRPr lang="en-US" dirty="0"/>
           </a:p>
@@ -11273,7 +11279,7 @@
             <a:pPr rtl="0"/>
             <a:fld id="{CD4F8076-E201-4AD9-9292-9CDC6E4C499D}" type="datetime1">
               <a:rPr lang="pt-PT" smtClean="0"/>
-              <a:t>23/01/2022</a:t>
+              <a:t>24/01/2022</a:t>
             </a:fld>
             <a:endParaRPr lang="en-US"/>
           </a:p>
@@ -11793,7 +11799,7 @@
             <a:pPr rtl="0"/>
             <a:fld id="{9CED0CAB-5C98-4633-8227-766380E8BC6E}" type="datetime1">
               <a:rPr lang="pt-PT" smtClean="0"/>
-              <a:t>23/01/2022</a:t>
+              <a:t>24/01/2022</a:t>
             </a:fld>
             <a:endParaRPr lang="en-US" dirty="0"/>
           </a:p>
@@ -11993,7 +11999,7 @@
             <a:pPr rtl="0"/>
             <a:fld id="{8222BAA2-AC6B-4746-8053-EDC8606E535A}" type="datetime1">
               <a:rPr lang="pt-PT" smtClean="0"/>
-              <a:t>23/01/2022</a:t>
+              <a:t>24/01/2022</a:t>
             </a:fld>
             <a:endParaRPr lang="en-US" dirty="0"/>
           </a:p>
@@ -12243,7 +12249,7 @@
             <a:pPr rtl="0"/>
             <a:fld id="{8EDC9CF0-46A2-4AC7-9FA2-8EC67FAC0032}" type="datetime1">
               <a:rPr lang="pt-PT" smtClean="0"/>
-              <a:t>23/01/2022</a:t>
+              <a:t>24/01/2022</a:t>
             </a:fld>
             <a:endParaRPr lang="en-US" dirty="0"/>
           </a:p>
@@ -12439,7 +12445,7 @@
             <a:pPr rtl="0"/>
             <a:fld id="{BBC3D2EF-A9F1-401A-8C02-1662D96CBA0D}" type="datetime1">
               <a:rPr lang="pt-PT" smtClean="0"/>
-              <a:t>23/01/2022</a:t>
+              <a:t>24/01/2022</a:t>
             </a:fld>
             <a:endParaRPr lang="en-US" dirty="0"/>
           </a:p>
@@ -12816,7 +12822,7 @@
             <a:pPr rtl="0"/>
             <a:fld id="{57582FB0-8268-4450-AEFB-7C755E727544}" type="datetime1">
               <a:rPr lang="pt-PT" smtClean="0"/>
-              <a:t>23/01/2022</a:t>
+              <a:t>24/01/2022</a:t>
             </a:fld>
             <a:endParaRPr lang="en-US" dirty="0"/>
           </a:p>
@@ -13087,7 +13093,7 @@
             <a:pPr rtl="0"/>
             <a:fld id="{56E0A07F-0364-433A-B636-12526FBF2765}" type="datetime1">
               <a:rPr lang="pt-PT" smtClean="0"/>
-              <a:t>23/01/2022</a:t>
+              <a:t>24/01/2022</a:t>
             </a:fld>
             <a:endParaRPr lang="en-US" dirty="0"/>
           </a:p>
@@ -13500,7 +13506,7 @@
             <a:pPr rtl="0"/>
             <a:fld id="{125BCC9B-3D00-4038-B827-05429894F1D1}" type="datetime1">
               <a:rPr lang="pt-PT" smtClean="0"/>
-              <a:t>23/01/2022</a:t>
+              <a:t>24/01/2022</a:t>
             </a:fld>
             <a:endParaRPr lang="en-US" dirty="0"/>
           </a:p>
@@ -13644,7 +13650,7 @@
             <a:pPr rtl="0"/>
             <a:fld id="{CE5B8D0D-025A-4217-B697-16EEC070DDC8}" type="datetime1">
               <a:rPr lang="pt-PT" smtClean="0"/>
-              <a:t>23/01/2022</a:t>
+              <a:t>24/01/2022</a:t>
             </a:fld>
             <a:endParaRPr lang="en-US" dirty="0"/>
           </a:p>
@@ -13804,7 +13810,7 @@
             <a:pPr rtl="0"/>
             <a:fld id="{FA763092-FB88-4F2E-B7A9-6AD9CA079CD0}" type="datetime1">
               <a:rPr lang="pt-PT" smtClean="0"/>
-              <a:t>23/01/2022</a:t>
+              <a:t>24/01/2022</a:t>
             </a:fld>
             <a:endParaRPr lang="en-US" dirty="0"/>
           </a:p>
@@ -14137,7 +14143,7 @@
             <a:pPr rtl="0"/>
             <a:fld id="{E55777FD-C41C-4ED6-9788-E0BDB29FE28C}" type="datetime1">
               <a:rPr lang="pt-PT" smtClean="0"/>
-              <a:t>23/01/2022</a:t>
+              <a:t>24/01/2022</a:t>
             </a:fld>
             <a:endParaRPr lang="en-US" dirty="0"/>
           </a:p>
@@ -14492,7 +14498,7 @@
             <a:pPr rtl="0"/>
             <a:fld id="{E2C937DC-1FD7-45E0-8375-82F139FBDB0A}" type="datetime1">
               <a:rPr lang="pt-PT" smtClean="0"/>
-              <a:t>23/01/2022</a:t>
+              <a:t>24/01/2022</a:t>
             </a:fld>
             <a:endParaRPr lang="en-US" dirty="0"/>
           </a:p>
@@ -14756,7 +14762,7 @@
             <a:pPr rtl="0"/>
             <a:fld id="{1F5BAF06-A1C3-41CD-B482-A3F55490B9C6}" type="datetime1">
               <a:rPr lang="pt-PT" smtClean="0"/>
-              <a:t>23/01/2022</a:t>
+              <a:t>24/01/2022</a:t>
             </a:fld>
             <a:endParaRPr lang="en-US" dirty="0"/>
           </a:p>
@@ -15801,7 +15807,7 @@
             <a:pPr rtl="0"/>
             <a:fld id="{BBC3D2EF-A9F1-401A-8C02-1662D96CBA0D}" type="datetime1">
               <a:rPr lang="pt-PT" smtClean="0"/>
-              <a:t>23/01/2022</a:t>
+              <a:t>24/01/2022</a:t>
             </a:fld>
             <a:endParaRPr lang="en-US" dirty="0"/>
           </a:p>
@@ -16039,7 +16045,7 @@
             <a:pPr rtl="0"/>
             <a:fld id="{BBC3D2EF-A9F1-401A-8C02-1662D96CBA0D}" type="datetime1">
               <a:rPr lang="pt-PT" smtClean="0"/>
-              <a:t>23/01/2022</a:t>
+              <a:t>24/01/2022</a:t>
             </a:fld>
             <a:endParaRPr lang="en-US" dirty="0"/>
           </a:p>
@@ -16407,7 +16413,7 @@
             <a:pPr rtl="0"/>
             <a:fld id="{BBC3D2EF-A9F1-401A-8C02-1662D96CBA0D}" type="datetime1">
               <a:rPr lang="pt-PT" smtClean="0"/>
-              <a:t>23/01/2022</a:t>
+              <a:t>24/01/2022</a:t>
             </a:fld>
             <a:endParaRPr lang="en-US" dirty="0"/>
           </a:p>
@@ -16664,7 +16670,7 @@
             <p:ph idx="1"/>
             <p:extLst>
               <p:ext uri="{D42A27DB-BD31-4B8C-83A1-F6EECF244321}">
-                <p14:modId xmlns:p14="http://schemas.microsoft.com/office/powerpoint/2010/main" val="2877639320"/>
+                <p14:modId xmlns:p14="http://schemas.microsoft.com/office/powerpoint/2010/main" val="3089593038"/>
               </p:ext>
             </p:extLst>
           </p:nvPr>
@@ -16777,7 +16783,7 @@
             <a:pPr rtl="0"/>
             <a:fld id="{BBC3D2EF-A9F1-401A-8C02-1662D96CBA0D}" type="datetime1">
               <a:rPr lang="pt-PT" smtClean="0"/>
-              <a:t>23/01/2022</a:t>
+              <a:t>24/01/2022</a:t>
             </a:fld>
             <a:endParaRPr lang="en-US" dirty="0"/>
           </a:p>
@@ -17399,7 +17405,7 @@
             <a:pPr rtl="0"/>
             <a:fld id="{BBC3D2EF-A9F1-401A-8C02-1662D96CBA0D}" type="datetime1">
               <a:rPr lang="pt-PT" smtClean="0"/>
-              <a:t>23/01/2022</a:t>
+              <a:t>24/01/2022</a:t>
             </a:fld>
             <a:endParaRPr lang="en-US" dirty="0"/>
           </a:p>
@@ -17586,7 +17592,7 @@
             <a:pPr rtl="0"/>
             <a:fld id="{BBC3D2EF-A9F1-401A-8C02-1662D96CBA0D}" type="datetime1">
               <a:rPr lang="pt-PT" smtClean="0"/>
-              <a:t>23/01/2022</a:t>
+              <a:t>24/01/2022</a:t>
             </a:fld>
             <a:endParaRPr lang="en-US" dirty="0"/>
           </a:p>
@@ -17786,7 +17792,7 @@
             <a:pPr rtl="0"/>
             <a:fld id="{BBC3D2EF-A9F1-401A-8C02-1662D96CBA0D}" type="datetime1">
               <a:rPr lang="pt-PT" smtClean="0"/>
-              <a:t>23/01/2022</a:t>
+              <a:t>24/01/2022</a:t>
             </a:fld>
             <a:endParaRPr lang="en-US" dirty="0"/>
           </a:p>
@@ -18203,7 +18209,7 @@
             <a:pPr rtl="0"/>
             <a:fld id="{BBC3D2EF-A9F1-401A-8C02-1662D96CBA0D}" type="datetime1">
               <a:rPr lang="pt-PT" smtClean="0"/>
-              <a:t>23/01/2022</a:t>
+              <a:t>24/01/2022</a:t>
             </a:fld>
             <a:endParaRPr lang="en-US" dirty="0"/>
           </a:p>
@@ -18433,7 +18439,7 @@
             <a:pPr rtl="0"/>
             <a:fld id="{BBC3D2EF-A9F1-401A-8C02-1662D96CBA0D}" type="datetime1">
               <a:rPr lang="pt-PT" smtClean="0"/>
-              <a:t>23/01/2022</a:t>
+              <a:t>24/01/2022</a:t>
             </a:fld>
             <a:endParaRPr lang="en-US" dirty="0"/>
           </a:p>
@@ -18739,7 +18745,7 @@
             <a:pPr rtl="0"/>
             <a:fld id="{BBC3D2EF-A9F1-401A-8C02-1662D96CBA0D}" type="datetime1">
               <a:rPr lang="pt-PT" smtClean="0"/>
-              <a:t>23/01/2022</a:t>
+              <a:t>24/01/2022</a:t>
             </a:fld>
             <a:endParaRPr lang="en-US" dirty="0"/>
           </a:p>

</xml_diff>